<commit_message>
feat: add a section about tools pattern
</commit_message>
<xml_diff>
--- a/slides/YABinar 2 - Mocks.pptx
+++ b/slides/YABinar 2 - Mocks.pptx
@@ -15,6 +15,7 @@
     <p:sldId id="260" r:id="rId9"/>
     <p:sldId id="261" r:id="rId10"/>
     <p:sldId id="262" r:id="rId11"/>
+    <p:sldId id="263" r:id="rId12"/>
   </p:sldIdLst>
   <p:sldSz cy="11303000" cx="20104100"/>
   <p:notesSz cx="6858000" cy="9144000"/>
@@ -1031,7 +1032,7 @@
       </p:grpSpPr>
       <p:sp>
         <p:nvSpPr>
-          <p:cNvPr id="53" name="Google Shape;53;g2498abe2057_0_0:notes"/>
+          <p:cNvPr id="53" name="Google Shape;53;g313cf6d98fe_0_0:notes"/>
           <p:cNvSpPr txBox="1"/>
           <p:nvPr>
             <p:ph idx="1" type="body"/>
@@ -1070,7 +1071,7 @@
       </p:sp>
       <p:sp>
         <p:nvSpPr>
-          <p:cNvPr id="54" name="Google Shape;54;g2498abe2057_0_0:notes"/>
+          <p:cNvPr id="54" name="Google Shape;54;g313cf6d98fe_0_0:notes"/>
           <p:cNvSpPr/>
           <p:nvPr>
             <p:ph idx="2" type="sldImg"/>
@@ -1130,7 +1131,7 @@
       </p:grpSpPr>
       <p:sp>
         <p:nvSpPr>
-          <p:cNvPr id="60" name="Google Shape;60;g24a98cf932a_0_6:notes"/>
+          <p:cNvPr id="60" name="Google Shape;60;g2498abe2057_0_0:notes"/>
           <p:cNvSpPr txBox="1"/>
           <p:nvPr>
             <p:ph idx="1" type="body"/>
@@ -1169,7 +1170,7 @@
       </p:sp>
       <p:sp>
         <p:nvSpPr>
-          <p:cNvPr id="61" name="Google Shape;61;g24a98cf932a_0_6:notes"/>
+          <p:cNvPr id="61" name="Google Shape;61;g2498abe2057_0_0:notes"/>
           <p:cNvSpPr/>
           <p:nvPr>
             <p:ph idx="2" type="sldImg"/>
@@ -1229,7 +1230,7 @@
       </p:grpSpPr>
       <p:sp>
         <p:nvSpPr>
-          <p:cNvPr id="67" name="Google Shape;67;g24a98cf932a_0_12:notes"/>
+          <p:cNvPr id="67" name="Google Shape;67;g24a98cf932a_0_6:notes"/>
           <p:cNvSpPr txBox="1"/>
           <p:nvPr>
             <p:ph idx="1" type="body"/>
@@ -1268,7 +1269,7 @@
       </p:sp>
       <p:sp>
         <p:nvSpPr>
-          <p:cNvPr id="68" name="Google Shape;68;g24a98cf932a_0_12:notes"/>
+          <p:cNvPr id="68" name="Google Shape;68;g24a98cf932a_0_6:notes"/>
           <p:cNvSpPr/>
           <p:nvPr>
             <p:ph idx="2" type="sldImg"/>
@@ -1314,7 +1315,7 @@
   <p:cSld>
     <p:spTree>
       <p:nvGrpSpPr>
-        <p:cNvPr id="74" name="Shape 74"/>
+        <p:cNvPr id="73" name="Shape 73"/>
         <p:cNvGrpSpPr/>
         <p:nvPr/>
       </p:nvGrpSpPr>
@@ -1328,7 +1329,7 @@
       </p:grpSpPr>
       <p:sp>
         <p:nvSpPr>
-          <p:cNvPr id="75" name="Google Shape;75;p11:notes"/>
+          <p:cNvPr id="74" name="Google Shape;74;g24a98cf932a_0_12:notes"/>
           <p:cNvSpPr txBox="1"/>
           <p:nvPr>
             <p:ph idx="1" type="body"/>
@@ -1367,7 +1368,106 @@
       </p:sp>
       <p:sp>
         <p:nvSpPr>
-          <p:cNvPr id="76" name="Google Shape;76;p11:notes"/>
+          <p:cNvPr id="75" name="Google Shape;75;g24a98cf932a_0_12:notes"/>
+          <p:cNvSpPr/>
+          <p:nvPr>
+            <p:ph idx="2" type="sldImg"/>
+          </p:nvPr>
+        </p:nvSpPr>
+        <p:spPr>
+          <a:xfrm>
+            <a:off x="1143000" y="685800"/>
+            <a:ext cx="4572000" cy="3429000"/>
+          </a:xfrm>
+          <a:custGeom>
+            <a:rect b="b" l="l" r="r" t="t"/>
+            <a:pathLst>
+              <a:path extrusionOk="0" h="120000" w="120000">
+                <a:moveTo>
+                  <a:pt x="0" y="0"/>
+                </a:moveTo>
+                <a:lnTo>
+                  <a:pt x="120000" y="0"/>
+                </a:lnTo>
+                <a:lnTo>
+                  <a:pt x="120000" y="120000"/>
+                </a:lnTo>
+                <a:lnTo>
+                  <a:pt x="0" y="120000"/>
+                </a:lnTo>
+                <a:close/>
+              </a:path>
+            </a:pathLst>
+          </a:custGeom>
+        </p:spPr>
+      </p:sp>
+    </p:spTree>
+  </p:cSld>
+  <p:clrMapOvr>
+    <a:masterClrMapping/>
+  </p:clrMapOvr>
+</p:notes>
+</file>
+
+<file path=ppt/notesSlides/notesSlide8.xml><?xml version="1.0" encoding="utf-8"?>
+<p:notes xmlns:a="http://schemas.openxmlformats.org/drawingml/2006/main" xmlns:r="http://schemas.openxmlformats.org/officeDocument/2006/relationships" xmlns:mc="http://schemas.openxmlformats.org/markup-compatibility/2006" xmlns:mv="urn:schemas-microsoft-com:mac:vml" xmlns:p="http://schemas.openxmlformats.org/presentationml/2006/main" xmlns:c="http://schemas.openxmlformats.org/drawingml/2006/chart" xmlns:dgm="http://schemas.openxmlformats.org/drawingml/2006/diagram" xmlns:o="urn:schemas-microsoft-com:office:office" xmlns:v="urn:schemas-microsoft-com:vml" xmlns:pvml="urn:schemas-microsoft-com:office:powerpoint" xmlns:com="http://schemas.openxmlformats.org/drawingml/2006/compatibility" xmlns:p14="http://schemas.microsoft.com/office/powerpoint/2010/main" xmlns:p15="http://schemas.microsoft.com/office/powerpoint/2012/main" xmlns:ahyp="http://schemas.microsoft.com/office/drawing/2018/hyperlinkcolor" showMasterPhAnim="0" showMasterSp="0">
+  <p:cSld>
+    <p:spTree>
+      <p:nvGrpSpPr>
+        <p:cNvPr id="81" name="Shape 81"/>
+        <p:cNvGrpSpPr/>
+        <p:nvPr/>
+      </p:nvGrpSpPr>
+      <p:grpSpPr>
+        <a:xfrm>
+          <a:off x="0" y="0"/>
+          <a:ext cx="0" cy="0"/>
+          <a:chOff x="0" y="0"/>
+          <a:chExt cx="0" cy="0"/>
+        </a:xfrm>
+      </p:grpSpPr>
+      <p:sp>
+        <p:nvSpPr>
+          <p:cNvPr id="82" name="Google Shape;82;p11:notes"/>
+          <p:cNvSpPr txBox="1"/>
+          <p:nvPr>
+            <p:ph idx="1" type="body"/>
+          </p:nvPr>
+        </p:nvSpPr>
+        <p:spPr>
+          <a:xfrm>
+            <a:off x="914400" y="4343400"/>
+            <a:ext cx="5029200" cy="4114800"/>
+          </a:xfrm>
+          <a:prstGeom prst="rect">
+            <a:avLst/>
+          </a:prstGeom>
+        </p:spPr>
+        <p:txBody>
+          <a:bodyPr anchorCtr="0" anchor="t" bIns="45700" lIns="91425" spcFirstLastPara="1" rIns="91425" wrap="square" tIns="45700">
+            <a:noAutofit/>
+          </a:bodyPr>
+          <a:lstStyle/>
+          <a:p>
+            <a:pPr indent="0" lvl="0" marL="0" rtl="0" algn="l">
+              <a:spcBef>
+                <a:spcPts val="0"/>
+              </a:spcBef>
+              <a:spcAft>
+                <a:spcPts val="0"/>
+              </a:spcAft>
+              <a:buNone/>
+            </a:pPr>
+            <a:r>
+              <a:t/>
+            </a:r>
+            <a:endParaRPr/>
+          </a:p>
+        </p:txBody>
+      </p:sp>
+      <p:sp>
+        <p:nvSpPr>
+          <p:cNvPr id="83" name="Google Shape;83;p11:notes"/>
           <p:cNvSpPr/>
           <p:nvPr>
             <p:ph idx="2" type="sldImg"/>
@@ -7146,7 +7246,7 @@
             </a:pPr>
             <a:r>
               <a:rPr lang="en-US"/>
-              <a:t>Makefile</a:t>
+              <a:t>Паттерн tools + mockery</a:t>
             </a:r>
             <a:endParaRPr/>
           </a:p>
@@ -7190,7 +7290,7 @@
         <p:spPr>
           <a:xfrm>
             <a:off x="587375" y="1524725"/>
-            <a:ext cx="19204200" cy="6125700"/>
+            <a:ext cx="19204200" cy="8966400"/>
           </a:xfrm>
           <a:prstGeom prst="rect">
             <a:avLst/>
@@ -7225,47 +7325,7 @@
             </a:pPr>
             <a:r>
               <a:rPr b="0" lang="en-US" sz="4000"/>
-              <a:t>Makefile - файл конфигурации утилиты </a:t>
-            </a:r>
-            <a:r>
-              <a:rPr b="0" i="1" lang="en-US" sz="4000"/>
-              <a:t>make</a:t>
-            </a:r>
-            <a:r>
-              <a:rPr b="0" lang="en-US" sz="4000"/>
-              <a:t>. Правила описываются на специальном (тьюринг-полном!) языке.</a:t>
-            </a:r>
-            <a:endParaRPr b="0" sz="4000"/>
-          </a:p>
-          <a:p>
-            <a:pPr indent="0" lvl="0" marL="0" marR="0" rtl="0" algn="l">
-              <a:lnSpc>
-                <a:spcPct val="150000"/>
-              </a:lnSpc>
-              <a:spcBef>
-                <a:spcPts val="0"/>
-              </a:spcBef>
-              <a:spcAft>
-                <a:spcPts val="0"/>
-              </a:spcAft>
-              <a:buClr>
-                <a:srgbClr val="FFFFFF"/>
-              </a:buClr>
-              <a:buSzPts val="4900"/>
-              <a:buFont typeface="Arial"/>
-              <a:buNone/>
-            </a:pPr>
-            <a:r>
-              <a:rPr b="0" lang="en-US" sz="4000"/>
-              <a:t>Как правило используется для автоматизации сборки програм. </a:t>
-            </a:r>
-            <a:r>
-              <a:rPr b="0" lang="en-US" sz="4000"/>
-              <a:t>Особенно</a:t>
-            </a:r>
-            <a:r>
-              <a:rPr b="0" lang="en-US" sz="4000"/>
-              <a:t> полезно, если этапы сборки зависят друг от друга.</a:t>
+              <a:t>Существует удобный паттерн управления зависимостями для разработки и тестирования (т.н. “devDependencies”).</a:t>
             </a:r>
             <a:endParaRPr b="0" sz="4000"/>
           </a:p>
@@ -7312,7 +7372,15 @@
             </a:pPr>
             <a:r>
               <a:rPr b="0" lang="en-US" sz="4000"/>
-              <a:t>Makefile помещается в корень проекта. Правило по умолчанию обычно позволяет полностью собрать приложение.</a:t>
+              <a:t>Расмотрим его на примере пакета </a:t>
+            </a:r>
+            <a:r>
+              <a:rPr b="0" i="1" lang="en-US" sz="4000"/>
+              <a:t>mockery</a:t>
+            </a:r>
+            <a:r>
+              <a:rPr b="0" lang="en-US" sz="4000"/>
+              <a:t>.</a:t>
             </a:r>
             <a:endParaRPr b="0" sz="4000"/>
           </a:p>
@@ -7389,7 +7457,7 @@
             </a:pPr>
             <a:r>
               <a:rPr lang="en-US"/>
-              <a:t>Линтеры</a:t>
+              <a:t>Makefile</a:t>
             </a:r>
             <a:endParaRPr/>
           </a:p>
@@ -7468,47 +7536,15 @@
             </a:pPr>
             <a:r>
               <a:rPr b="0" lang="en-US" sz="4000"/>
-              <a:t>Go поставляет несколько стандартных линтеров:</a:t>
+              <a:t>Makefile - файл конфигурации утилиты </a:t>
             </a:r>
-            <a:endParaRPr b="0" sz="4000"/>
-          </a:p>
-          <a:p>
-            <a:pPr indent="-482600" lvl="0" marL="457200" marR="0" rtl="0" algn="l">
-              <a:lnSpc>
-                <a:spcPct val="150000"/>
-              </a:lnSpc>
-              <a:spcBef>
-                <a:spcPts val="0"/>
-              </a:spcBef>
-              <a:spcAft>
-                <a:spcPts val="0"/>
-              </a:spcAft>
-              <a:buSzPts val="4000"/>
-              <a:buChar char="-"/>
-            </a:pPr>
             <a:r>
               <a:rPr b="0" i="1" lang="en-US" sz="4000"/>
-              <a:t>gofmt</a:t>
+              <a:t>make</a:t>
             </a:r>
-            <a:endParaRPr b="0" sz="4000"/>
-          </a:p>
-          <a:p>
-            <a:pPr indent="-482600" lvl="0" marL="457200" marR="0" rtl="0" algn="l">
-              <a:lnSpc>
-                <a:spcPct val="150000"/>
-              </a:lnSpc>
-              <a:spcBef>
-                <a:spcPts val="0"/>
-              </a:spcBef>
-              <a:spcAft>
-                <a:spcPts val="0"/>
-              </a:spcAft>
-              <a:buSzPts val="4000"/>
-              <a:buChar char="-"/>
-            </a:pPr>
             <a:r>
-              <a:rPr b="0" i="1" lang="en-US" sz="4000"/>
-              <a:t>govet</a:t>
+              <a:rPr b="0" lang="en-US" sz="4000"/>
+              <a:t>. Правила описываются на специальном (тьюринг-полном!) языке.</a:t>
             </a:r>
             <a:endParaRPr b="0" sz="4000"/>
           </a:p>
@@ -7523,6 +7559,43 @@
               <a:spcAft>
                 <a:spcPts val="0"/>
               </a:spcAft>
+              <a:buClr>
+                <a:srgbClr val="FFFFFF"/>
+              </a:buClr>
+              <a:buSzPts val="4900"/>
+              <a:buFont typeface="Arial"/>
+              <a:buNone/>
+            </a:pPr>
+            <a:r>
+              <a:rPr b="0" lang="en-US" sz="4000"/>
+              <a:t>Как правило используется для автоматизации сборки програм. </a:t>
+            </a:r>
+            <a:r>
+              <a:rPr b="0" lang="en-US" sz="4000"/>
+              <a:t>Особенно</a:t>
+            </a:r>
+            <a:r>
+              <a:rPr b="0" lang="en-US" sz="4000"/>
+              <a:t> полезно, если этапы сборки зависят друг от друга.</a:t>
+            </a:r>
+            <a:endParaRPr b="0" sz="4000"/>
+          </a:p>
+          <a:p>
+            <a:pPr indent="0" lvl="0" marL="0" marR="0" rtl="0" algn="l">
+              <a:lnSpc>
+                <a:spcPct val="150000"/>
+              </a:lnSpc>
+              <a:spcBef>
+                <a:spcPts val="0"/>
+              </a:spcBef>
+              <a:spcAft>
+                <a:spcPts val="0"/>
+              </a:spcAft>
+              <a:buClr>
+                <a:srgbClr val="FFFFFF"/>
+              </a:buClr>
+              <a:buSzPts val="4900"/>
+              <a:buFont typeface="Arial"/>
               <a:buNone/>
             </a:pPr>
             <a:r>
@@ -7541,47 +7614,16 @@
               <a:spcAft>
                 <a:spcPts val="0"/>
               </a:spcAft>
+              <a:buClr>
+                <a:srgbClr val="FFFFFF"/>
+              </a:buClr>
+              <a:buSzPts val="4900"/>
+              <a:buFont typeface="Arial"/>
               <a:buNone/>
             </a:pPr>
             <a:r>
               <a:rPr b="0" lang="en-US" sz="4000"/>
-              <a:t>VSCode</a:t>
-            </a:r>
-            <a:r>
-              <a:rPr lang="en-US"/>
-              <a:t> </a:t>
-            </a:r>
-            <a:r>
-              <a:rPr b="0" lang="en-US" sz="4000"/>
-              <a:t>использует несколько дополнительных линтеров.</a:t>
-            </a:r>
-            <a:endParaRPr b="0" sz="4000"/>
-          </a:p>
-          <a:p>
-            <a:pPr indent="0" lvl="0" marL="0" rtl="0" algn="l">
-              <a:lnSpc>
-                <a:spcPct val="150000"/>
-              </a:lnSpc>
-              <a:spcBef>
-                <a:spcPts val="0"/>
-              </a:spcBef>
-              <a:spcAft>
-                <a:spcPts val="0"/>
-              </a:spcAft>
-              <a:buClr>
-                <a:schemeClr val="dk1"/>
-              </a:buClr>
-              <a:buSzPts val="1100"/>
-              <a:buFont typeface="Arial"/>
-              <a:buNone/>
-            </a:pPr>
-            <a:r>
-              <a:rPr b="0" lang="en-US" sz="4000">
-                <a:solidFill>
-                  <a:schemeClr val="lt1"/>
-                </a:solidFill>
-              </a:rPr>
-              <a:t>Стандартные линтеры ловят не все проблемы :(</a:t>
+              <a:t>Makefile помещается в корень проекта. Правило по умолчанию обычно позволяет полностью собрать приложение.</a:t>
             </a:r>
             <a:endParaRPr b="0" sz="4000"/>
           </a:p>
@@ -7658,7 +7700,7 @@
             </a:pPr>
             <a:r>
               <a:rPr lang="en-US"/>
-              <a:t>golangci-lint</a:t>
+              <a:t>Линтеры</a:t>
             </a:r>
             <a:endParaRPr/>
           </a:p>
@@ -7728,6 +7770,275 @@
               <a:spcAft>
                 <a:spcPts val="0"/>
               </a:spcAft>
+              <a:buClr>
+                <a:srgbClr val="FFFFFF"/>
+              </a:buClr>
+              <a:buSzPts val="4900"/>
+              <a:buFont typeface="Arial"/>
+              <a:buNone/>
+            </a:pPr>
+            <a:r>
+              <a:rPr b="0" lang="en-US" sz="4000"/>
+              <a:t>Go поставляет несколько стандартных линтеров:</a:t>
+            </a:r>
+            <a:endParaRPr b="0" sz="4000"/>
+          </a:p>
+          <a:p>
+            <a:pPr indent="-482600" lvl="0" marL="457200" marR="0" rtl="0" algn="l">
+              <a:lnSpc>
+                <a:spcPct val="150000"/>
+              </a:lnSpc>
+              <a:spcBef>
+                <a:spcPts val="0"/>
+              </a:spcBef>
+              <a:spcAft>
+                <a:spcPts val="0"/>
+              </a:spcAft>
+              <a:buSzPts val="4000"/>
+              <a:buChar char="-"/>
+            </a:pPr>
+            <a:r>
+              <a:rPr b="0" i="1" lang="en-US" sz="4000"/>
+              <a:t>gofmt</a:t>
+            </a:r>
+            <a:endParaRPr b="0" sz="4000"/>
+          </a:p>
+          <a:p>
+            <a:pPr indent="-482600" lvl="0" marL="457200" marR="0" rtl="0" algn="l">
+              <a:lnSpc>
+                <a:spcPct val="150000"/>
+              </a:lnSpc>
+              <a:spcBef>
+                <a:spcPts val="0"/>
+              </a:spcBef>
+              <a:spcAft>
+                <a:spcPts val="0"/>
+              </a:spcAft>
+              <a:buSzPts val="4000"/>
+              <a:buChar char="-"/>
+            </a:pPr>
+            <a:r>
+              <a:rPr b="0" i="1" lang="en-US" sz="4000"/>
+              <a:t>govet</a:t>
+            </a:r>
+            <a:endParaRPr b="0" sz="4000"/>
+          </a:p>
+          <a:p>
+            <a:pPr indent="0" lvl="0" marL="0" marR="0" rtl="0" algn="l">
+              <a:lnSpc>
+                <a:spcPct val="150000"/>
+              </a:lnSpc>
+              <a:spcBef>
+                <a:spcPts val="0"/>
+              </a:spcBef>
+              <a:spcAft>
+                <a:spcPts val="0"/>
+              </a:spcAft>
+              <a:buNone/>
+            </a:pPr>
+            <a:r>
+              <a:t/>
+            </a:r>
+            <a:endParaRPr b="0" sz="4000"/>
+          </a:p>
+          <a:p>
+            <a:pPr indent="0" lvl="0" marL="0" marR="0" rtl="0" algn="l">
+              <a:lnSpc>
+                <a:spcPct val="150000"/>
+              </a:lnSpc>
+              <a:spcBef>
+                <a:spcPts val="0"/>
+              </a:spcBef>
+              <a:spcAft>
+                <a:spcPts val="0"/>
+              </a:spcAft>
+              <a:buNone/>
+            </a:pPr>
+            <a:r>
+              <a:rPr b="0" lang="en-US" sz="4000"/>
+              <a:t>VSCode</a:t>
+            </a:r>
+            <a:r>
+              <a:rPr lang="en-US"/>
+              <a:t> </a:t>
+            </a:r>
+            <a:r>
+              <a:rPr b="0" lang="en-US" sz="4000"/>
+              <a:t>использует несколько дополнительных линтеров.</a:t>
+            </a:r>
+            <a:endParaRPr b="0" sz="4000"/>
+          </a:p>
+          <a:p>
+            <a:pPr indent="0" lvl="0" marL="0" rtl="0" algn="l">
+              <a:lnSpc>
+                <a:spcPct val="150000"/>
+              </a:lnSpc>
+              <a:spcBef>
+                <a:spcPts val="0"/>
+              </a:spcBef>
+              <a:spcAft>
+                <a:spcPts val="0"/>
+              </a:spcAft>
+              <a:buClr>
+                <a:schemeClr val="dk1"/>
+              </a:buClr>
+              <a:buSzPts val="1100"/>
+              <a:buFont typeface="Arial"/>
+              <a:buNone/>
+            </a:pPr>
+            <a:r>
+              <a:rPr b="0" lang="en-US" sz="4000">
+                <a:solidFill>
+                  <a:schemeClr val="lt1"/>
+                </a:solidFill>
+              </a:rPr>
+              <a:t>Стандартные линтеры ловят не все проблемы :(</a:t>
+            </a:r>
+            <a:endParaRPr b="0" sz="4000"/>
+          </a:p>
+        </p:txBody>
+      </p:sp>
+    </p:spTree>
+  </p:cSld>
+  <p:clrMapOvr>
+    <a:masterClrMapping/>
+  </p:clrMapOvr>
+</p:sld>
+</file>
+
+<file path=ppt/slides/slide7.xml><?xml version="1.0" encoding="utf-8"?>
+<p:sld xmlns:a="http://schemas.openxmlformats.org/drawingml/2006/main" xmlns:r="http://schemas.openxmlformats.org/officeDocument/2006/relationships" xmlns:mc="http://schemas.openxmlformats.org/markup-compatibility/2006" xmlns:mv="urn:schemas-microsoft-com:mac:vml" xmlns:p="http://schemas.openxmlformats.org/presentationml/2006/main" xmlns:c="http://schemas.openxmlformats.org/drawingml/2006/chart" xmlns:dgm="http://schemas.openxmlformats.org/drawingml/2006/diagram" xmlns:o="urn:schemas-microsoft-com:office:office" xmlns:v="urn:schemas-microsoft-com:vml" xmlns:pvml="urn:schemas-microsoft-com:office:powerpoint" xmlns:com="http://schemas.openxmlformats.org/drawingml/2006/compatibility" xmlns:p14="http://schemas.microsoft.com/office/powerpoint/2010/main" xmlns:p15="http://schemas.microsoft.com/office/powerpoint/2012/main" xmlns:ahyp="http://schemas.microsoft.com/office/drawing/2018/hyperlinkcolor">
+  <p:cSld>
+    <p:spTree>
+      <p:nvGrpSpPr>
+        <p:cNvPr id="76" name="Shape 76"/>
+        <p:cNvGrpSpPr/>
+        <p:nvPr/>
+      </p:nvGrpSpPr>
+      <p:grpSpPr>
+        <a:xfrm>
+          <a:off x="0" y="0"/>
+          <a:ext cx="0" cy="0"/>
+          <a:chOff x="0" y="0"/>
+          <a:chExt cx="0" cy="0"/>
+        </a:xfrm>
+      </p:grpSpPr>
+      <p:sp>
+        <p:nvSpPr>
+          <p:cNvPr id="77" name="Google Shape;77;p13"/>
+          <p:cNvSpPr txBox="1"/>
+          <p:nvPr>
+            <p:ph type="title"/>
+          </p:nvPr>
+        </p:nvSpPr>
+        <p:spPr>
+          <a:xfrm>
+            <a:off x="1699218" y="168275"/>
+            <a:ext cx="16632600" cy="761700"/>
+          </a:xfrm>
+          <a:prstGeom prst="rect">
+            <a:avLst/>
+          </a:prstGeom>
+          <a:noFill/>
+          <a:ln>
+            <a:noFill/>
+          </a:ln>
+        </p:spPr>
+        <p:txBody>
+          <a:bodyPr anchorCtr="0" anchor="t" bIns="0" lIns="0" spcFirstLastPara="1" rIns="0" wrap="square" tIns="0">
+            <a:normAutofit/>
+          </a:bodyPr>
+          <a:lstStyle/>
+          <a:p>
+            <a:pPr indent="0" lvl="0" marL="0" marR="0" rtl="0" algn="l">
+              <a:lnSpc>
+                <a:spcPct val="100000"/>
+              </a:lnSpc>
+              <a:spcBef>
+                <a:spcPts val="0"/>
+              </a:spcBef>
+              <a:spcAft>
+                <a:spcPts val="0"/>
+              </a:spcAft>
+              <a:buClr>
+                <a:srgbClr val="FFFFFF"/>
+              </a:buClr>
+              <a:buSzPts val="4900"/>
+              <a:buFont typeface="Arial"/>
+              <a:buNone/>
+            </a:pPr>
+            <a:r>
+              <a:rPr lang="en-US"/>
+              <a:t>golangci-lint</a:t>
+            </a:r>
+            <a:endParaRPr/>
+          </a:p>
+        </p:txBody>
+      </p:sp>
+      <p:pic>
+        <p:nvPicPr>
+          <p:cNvPr descr="Google Shape;117;p5" id="78" name="Google Shape;78;p13"/>
+          <p:cNvPicPr preferRelativeResize="0"/>
+          <p:nvPr/>
+        </p:nvPicPr>
+        <p:blipFill rotWithShape="1">
+          <a:blip r:embed="rId3">
+            <a:alphaModFix/>
+          </a:blip>
+          <a:srcRect b="0" l="0" r="0" t="0"/>
+          <a:stretch/>
+        </p:blipFill>
+        <p:spPr>
+          <a:xfrm>
+            <a:off x="689999" y="10349100"/>
+            <a:ext cx="3007539" cy="422126"/>
+          </a:xfrm>
+          <a:prstGeom prst="rect">
+            <a:avLst/>
+          </a:prstGeom>
+          <a:noFill/>
+          <a:ln>
+            <a:noFill/>
+          </a:ln>
+        </p:spPr>
+      </p:pic>
+      <p:sp>
+        <p:nvSpPr>
+          <p:cNvPr id="79" name="Google Shape;79;p13"/>
+          <p:cNvSpPr txBox="1"/>
+          <p:nvPr>
+            <p:ph type="title"/>
+          </p:nvPr>
+        </p:nvSpPr>
+        <p:spPr>
+          <a:xfrm>
+            <a:off x="587375" y="1524725"/>
+            <a:ext cx="19204200" cy="6125700"/>
+          </a:xfrm>
+          <a:prstGeom prst="rect">
+            <a:avLst/>
+          </a:prstGeom>
+          <a:noFill/>
+          <a:ln>
+            <a:noFill/>
+          </a:ln>
+        </p:spPr>
+        <p:txBody>
+          <a:bodyPr anchorCtr="0" anchor="t" bIns="0" lIns="0" spcFirstLastPara="1" rIns="0" wrap="square" tIns="0">
+            <a:normAutofit/>
+          </a:bodyPr>
+          <a:lstStyle/>
+          <a:p>
+            <a:pPr indent="0" lvl="0" marL="0" marR="0" rtl="0" algn="l">
+              <a:lnSpc>
+                <a:spcPct val="150000"/>
+              </a:lnSpc>
+              <a:spcBef>
+                <a:spcPts val="0"/>
+              </a:spcBef>
+              <a:spcAft>
+                <a:spcPts val="0"/>
+              </a:spcAft>
               <a:buNone/>
             </a:pPr>
             <a:r>
@@ -7777,7 +8088,7 @@
       </p:sp>
       <p:pic>
         <p:nvPicPr>
-          <p:cNvPr id="73" name="Google Shape;73;p12"/>
+          <p:cNvPr id="80" name="Google Shape;80;p13"/>
           <p:cNvPicPr preferRelativeResize="0"/>
           <p:nvPr/>
         </p:nvPicPr>
@@ -7811,12 +8122,12 @@
 </p:sld>
 </file>
 
-<file path=ppt/slides/slide7.xml><?xml version="1.0" encoding="utf-8"?>
+<file path=ppt/slides/slide8.xml><?xml version="1.0" encoding="utf-8"?>
 <p:sld xmlns:a="http://schemas.openxmlformats.org/drawingml/2006/main" xmlns:r="http://schemas.openxmlformats.org/officeDocument/2006/relationships" xmlns:mc="http://schemas.openxmlformats.org/markup-compatibility/2006" xmlns:mv="urn:schemas-microsoft-com:mac:vml" xmlns:p="http://schemas.openxmlformats.org/presentationml/2006/main" xmlns:c="http://schemas.openxmlformats.org/drawingml/2006/chart" xmlns:dgm="http://schemas.openxmlformats.org/drawingml/2006/diagram" xmlns:o="urn:schemas-microsoft-com:office:office" xmlns:v="urn:schemas-microsoft-com:vml" xmlns:pvml="urn:schemas-microsoft-com:office:powerpoint" xmlns:com="http://schemas.openxmlformats.org/drawingml/2006/compatibility" xmlns:p14="http://schemas.microsoft.com/office/powerpoint/2010/main" xmlns:p15="http://schemas.microsoft.com/office/powerpoint/2012/main" xmlns:ahyp="http://schemas.microsoft.com/office/drawing/2018/hyperlinkcolor">
   <p:cSld>
     <p:spTree>
       <p:nvGrpSpPr>
-        <p:cNvPr id="77" name="Shape 77"/>
+        <p:cNvPr id="84" name="Shape 84"/>
         <p:cNvGrpSpPr/>
         <p:nvPr/>
       </p:nvGrpSpPr>
@@ -7830,7 +8141,7 @@
       </p:grpSpPr>
       <p:sp>
         <p:nvSpPr>
-          <p:cNvPr id="78" name="Google Shape;78;p13"/>
+          <p:cNvPr id="85" name="Google Shape;85;p14"/>
           <p:cNvSpPr txBox="1"/>
           <p:nvPr>
             <p:ph type="title"/>
@@ -7891,7 +8202,7 @@
       </p:sp>
       <p:cxnSp>
         <p:nvCxnSpPr>
-          <p:cNvPr id="79" name="Google Shape;79;p13"/>
+          <p:cNvPr id="86" name="Google Shape;86;p14"/>
           <p:cNvCxnSpPr/>
           <p:nvPr/>
         </p:nvCxnSpPr>
@@ -7917,7 +8228,7 @@
       </p:cxnSp>
       <p:cxnSp>
         <p:nvCxnSpPr>
-          <p:cNvPr id="80" name="Google Shape;80;p13"/>
+          <p:cNvPr id="87" name="Google Shape;87;p14"/>
           <p:cNvCxnSpPr/>
           <p:nvPr/>
         </p:nvCxnSpPr>
@@ -7943,7 +8254,7 @@
       </p:cxnSp>
       <p:cxnSp>
         <p:nvCxnSpPr>
-          <p:cNvPr id="81" name="Google Shape;81;p13"/>
+          <p:cNvPr id="88" name="Google Shape;88;p14"/>
           <p:cNvCxnSpPr/>
           <p:nvPr/>
         </p:nvCxnSpPr>
@@ -7969,7 +8280,7 @@
       </p:cxnSp>
       <p:pic>
         <p:nvPicPr>
-          <p:cNvPr descr="Google Shape;199;p10" id="82" name="Google Shape;82;p13"/>
+          <p:cNvPr descr="Google Shape;199;p10" id="89" name="Google Shape;89;p14"/>
           <p:cNvPicPr preferRelativeResize="0"/>
           <p:nvPr/>
         </p:nvPicPr>
@@ -7996,7 +8307,7 @@
       </p:pic>
       <p:sp>
         <p:nvSpPr>
-          <p:cNvPr id="83" name="Google Shape;83;p13"/>
+          <p:cNvPr id="90" name="Google Shape;90;p14"/>
           <p:cNvSpPr txBox="1"/>
           <p:nvPr>
             <p:ph type="title"/>

</xml_diff>